<commit_message>
update first step project.
</commit_message>
<xml_diff>
--- a/project/robotic_arm/image.pptx
+++ b/project/robotic_arm/image.pptx
@@ -106,6 +106,11 @@
       </a:defRPr>
     </a:lvl9pPr>
   </p:defaultTextStyle>
+  <p:extLst>
+    <p:ext uri="{EFAFB233-063F-42B5-8137-9DF3F51BA10A}">
+      <p15:sldGuideLst xmlns:p15="http://schemas.microsoft.com/office/powerpoint/2012/main"/>
+    </p:ext>
+  </p:extLst>
 </p:presentation>
 </file>
 
@@ -256,7 +261,7 @@
           <a:p>
             <a:fld id="{9BB8979A-587A-4833-B21E-B401F1F9111F}" type="datetimeFigureOut">
               <a:rPr lang="en-US" smtClean="0"/>
-              <a:t>10-May-20</a:t>
+              <a:t>11-May-20</a:t>
             </a:fld>
             <a:endParaRPr lang="en-US"/>
           </a:p>
@@ -454,7 +459,7 @@
           <a:p>
             <a:fld id="{9BB8979A-587A-4833-B21E-B401F1F9111F}" type="datetimeFigureOut">
               <a:rPr lang="en-US" smtClean="0"/>
-              <a:t>10-May-20</a:t>
+              <a:t>11-May-20</a:t>
             </a:fld>
             <a:endParaRPr lang="en-US"/>
           </a:p>
@@ -662,7 +667,7 @@
           <a:p>
             <a:fld id="{9BB8979A-587A-4833-B21E-B401F1F9111F}" type="datetimeFigureOut">
               <a:rPr lang="en-US" smtClean="0"/>
-              <a:t>10-May-20</a:t>
+              <a:t>11-May-20</a:t>
             </a:fld>
             <a:endParaRPr lang="en-US"/>
           </a:p>
@@ -860,7 +865,7 @@
           <a:p>
             <a:fld id="{9BB8979A-587A-4833-B21E-B401F1F9111F}" type="datetimeFigureOut">
               <a:rPr lang="en-US" smtClean="0"/>
-              <a:t>10-May-20</a:t>
+              <a:t>11-May-20</a:t>
             </a:fld>
             <a:endParaRPr lang="en-US"/>
           </a:p>
@@ -1135,7 +1140,7 @@
           <a:p>
             <a:fld id="{9BB8979A-587A-4833-B21E-B401F1F9111F}" type="datetimeFigureOut">
               <a:rPr lang="en-US" smtClean="0"/>
-              <a:t>10-May-20</a:t>
+              <a:t>11-May-20</a:t>
             </a:fld>
             <a:endParaRPr lang="en-US"/>
           </a:p>
@@ -1400,7 +1405,7 @@
           <a:p>
             <a:fld id="{9BB8979A-587A-4833-B21E-B401F1F9111F}" type="datetimeFigureOut">
               <a:rPr lang="en-US" smtClean="0"/>
-              <a:t>10-May-20</a:t>
+              <a:t>11-May-20</a:t>
             </a:fld>
             <a:endParaRPr lang="en-US"/>
           </a:p>
@@ -1812,7 +1817,7 @@
           <a:p>
             <a:fld id="{9BB8979A-587A-4833-B21E-B401F1F9111F}" type="datetimeFigureOut">
               <a:rPr lang="en-US" smtClean="0"/>
-              <a:t>10-May-20</a:t>
+              <a:t>11-May-20</a:t>
             </a:fld>
             <a:endParaRPr lang="en-US"/>
           </a:p>
@@ -1953,7 +1958,7 @@
           <a:p>
             <a:fld id="{9BB8979A-587A-4833-B21E-B401F1F9111F}" type="datetimeFigureOut">
               <a:rPr lang="en-US" smtClean="0"/>
-              <a:t>10-May-20</a:t>
+              <a:t>11-May-20</a:t>
             </a:fld>
             <a:endParaRPr lang="en-US"/>
           </a:p>
@@ -2066,7 +2071,7 @@
           <a:p>
             <a:fld id="{9BB8979A-587A-4833-B21E-B401F1F9111F}" type="datetimeFigureOut">
               <a:rPr lang="en-US" smtClean="0"/>
-              <a:t>10-May-20</a:t>
+              <a:t>11-May-20</a:t>
             </a:fld>
             <a:endParaRPr lang="en-US"/>
           </a:p>
@@ -2377,7 +2382,7 @@
           <a:p>
             <a:fld id="{9BB8979A-587A-4833-B21E-B401F1F9111F}" type="datetimeFigureOut">
               <a:rPr lang="en-US" smtClean="0"/>
-              <a:t>10-May-20</a:t>
+              <a:t>11-May-20</a:t>
             </a:fld>
             <a:endParaRPr lang="en-US"/>
           </a:p>
@@ -2665,7 +2670,7 @@
           <a:p>
             <a:fld id="{9BB8979A-587A-4833-B21E-B401F1F9111F}" type="datetimeFigureOut">
               <a:rPr lang="en-US" smtClean="0"/>
-              <a:t>10-May-20</a:t>
+              <a:t>11-May-20</a:t>
             </a:fld>
             <a:endParaRPr lang="en-US"/>
           </a:p>
@@ -2906,7 +2911,7 @@
           <a:p>
             <a:fld id="{9BB8979A-587A-4833-B21E-B401F1F9111F}" type="datetimeFigureOut">
               <a:rPr lang="en-US" smtClean="0"/>
-              <a:t>10-May-20</a:t>
+              <a:t>11-May-20</a:t>
             </a:fld>
             <a:endParaRPr lang="en-US"/>
           </a:p>
@@ -4731,10 +4736,10 @@
       </p:sp>
       <p:pic>
         <p:nvPicPr>
-          <p:cNvPr id="4" name="Picture 3">
-            <a:extLst>
-              <a:ext uri="{FF2B5EF4-FFF2-40B4-BE49-F238E27FC236}">
-                <a16:creationId xmlns:a16="http://schemas.microsoft.com/office/drawing/2014/main" id="{69F11553-521E-4B16-9EF1-46278E902CB6}"/>
+          <p:cNvPr id="3" name="Picture 2">
+            <a:extLst>
+              <a:ext uri="{FF2B5EF4-FFF2-40B4-BE49-F238E27FC236}">
+                <a16:creationId xmlns:a16="http://schemas.microsoft.com/office/drawing/2014/main" id="{FDACB28A-CC3E-4017-9C72-849CB8A2B01C}"/>
               </a:ext>
             </a:extLst>
           </p:cNvPr>
@@ -4750,9 +4755,39 @@
           </a:stretch>
         </p:blipFill>
         <p:spPr>
+          <a:xfrm rot="5400000">
+            <a:off x="3579346" y="2358236"/>
+            <a:ext cx="3214156" cy="4530188"/>
+          </a:xfrm>
+          <a:prstGeom prst="rect">
+            <a:avLst/>
+          </a:prstGeom>
+        </p:spPr>
+      </p:pic>
+      <p:pic>
+        <p:nvPicPr>
+          <p:cNvPr id="5" name="Picture 4">
+            <a:extLst>
+              <a:ext uri="{FF2B5EF4-FFF2-40B4-BE49-F238E27FC236}">
+                <a16:creationId xmlns:a16="http://schemas.microsoft.com/office/drawing/2014/main" id="{67C7DE8F-F9AE-4156-BE82-D29B1CD6E65A}"/>
+              </a:ext>
+            </a:extLst>
+          </p:cNvPr>
+          <p:cNvPicPr>
+            <a:picLocks noChangeAspect="1"/>
+          </p:cNvPicPr>
+          <p:nvPr/>
+        </p:nvPicPr>
+        <p:blipFill>
+          <a:blip r:embed="rId3"/>
+          <a:stretch>
+            <a:fillRect/>
+          </a:stretch>
+        </p:blipFill>
+        <p:spPr>
           <a:xfrm>
-            <a:off x="600373" y="1783433"/>
-            <a:ext cx="10455546" cy="4621169"/>
+            <a:off x="967779" y="1690688"/>
+            <a:ext cx="849146" cy="1024623"/>
           </a:xfrm>
           <a:prstGeom prst="rect">
             <a:avLst/>

</xml_diff>